<commit_message>
Adding example code for form validation
</commit_message>
<xml_diff>
--- a/unit_00/html_review/06 jQuery.pptx
+++ b/unit_00/html_review/06 jQuery.pptx
@@ -234,7 +234,7 @@
           <a:p>
             <a:fld id="{3F839238-B565-4611-A910-43B731DECEC1}" type="datetimeFigureOut">
               <a:rPr lang="en-US" smtClean="0"/>
-              <a:t>8/20/2020</a:t>
+              <a:t>8/25/2020</a:t>
             </a:fld>
             <a:endParaRPr lang="en-US" dirty="0"/>
           </a:p>
@@ -3317,7 +3317,7 @@
           <a:p>
             <a:fld id="{E9F25E47-8026-47FD-8FD6-2C7B55A6BE4F}" type="datetime1">
               <a:rPr lang="en-US" smtClean="0"/>
-              <a:t>8/20/2020</a:t>
+              <a:t>8/25/2020</a:t>
             </a:fld>
             <a:endParaRPr lang="en-US" dirty="0"/>
           </a:p>
@@ -3519,7 +3519,7 @@
           <a:p>
             <a:fld id="{49F0A7AA-AB30-4D36-B646-A02FA5DCCA55}" type="datetime1">
               <a:rPr lang="en-US" smtClean="0"/>
-              <a:t>8/20/2020</a:t>
+              <a:t>8/25/2020</a:t>
             </a:fld>
             <a:endParaRPr lang="en-US" dirty="0"/>
           </a:p>
@@ -4118,7 +4118,7 @@
           <a:p>
             <a:fld id="{CFA4D178-B71E-4B10-AF0F-C5E0B7294A7C}" type="datetime1">
               <a:rPr lang="en-US" smtClean="0"/>
-              <a:t>8/20/2020</a:t>
+              <a:t>8/25/2020</a:t>
             </a:fld>
             <a:endParaRPr lang="en-US" dirty="0"/>
           </a:p>
@@ -4438,7 +4438,7 @@
           <a:p>
             <a:fld id="{27E6D853-85C2-4120-A6B2-2EAC4467BF8B}" type="datetime1">
               <a:rPr lang="en-US" smtClean="0"/>
-              <a:t>8/20/2020</a:t>
+              <a:t>8/25/2020</a:t>
             </a:fld>
             <a:endParaRPr lang="en-US" dirty="0"/>
           </a:p>
@@ -4875,7 +4875,7 @@
           <a:p>
             <a:fld id="{CA3AECF5-4644-4878-B4B4-3AC946C4B252}" type="datetime1">
               <a:rPr lang="en-US" smtClean="0"/>
-              <a:t>8/20/2020</a:t>
+              <a:t>8/25/2020</a:t>
             </a:fld>
             <a:endParaRPr lang="en-US" dirty="0"/>
           </a:p>
@@ -4993,7 +4993,7 @@
           <a:p>
             <a:fld id="{B8E389F8-4EAE-4B22-8731-40270585493B}" type="datetime1">
               <a:rPr lang="en-US" smtClean="0"/>
-              <a:t>8/20/2020</a:t>
+              <a:t>8/25/2020</a:t>
             </a:fld>
             <a:endParaRPr lang="en-US" dirty="0"/>
           </a:p>
@@ -5088,7 +5088,7 @@
           <a:p>
             <a:fld id="{772F4F3F-699B-4D10-AAB9-00C2579C25F8}" type="datetime1">
               <a:rPr lang="en-US" smtClean="0"/>
-              <a:t>8/20/2020</a:t>
+              <a:t>8/25/2020</a:t>
             </a:fld>
             <a:endParaRPr lang="en-US" dirty="0"/>
           </a:p>
@@ -5505,7 +5505,7 @@
           <a:p>
             <a:fld id="{E51BA90F-EE6C-42F5-8961-2F52EE18037D}" type="datetime1">
               <a:rPr lang="en-US" smtClean="0"/>
-              <a:t>8/20/2020</a:t>
+              <a:t>8/25/2020</a:t>
             </a:fld>
             <a:endParaRPr lang="en-US" dirty="0"/>
           </a:p>
@@ -5765,7 +5765,7 @@
           <a:p>
             <a:fld id="{FB6292F5-AD2B-47F4-B460-BF55BF34C27D}" type="datetime1">
               <a:rPr lang="en-US" smtClean="0"/>
-              <a:t>8/20/2020</a:t>
+              <a:t>8/25/2020</a:t>
             </a:fld>
             <a:endParaRPr lang="en-US" dirty="0"/>
           </a:p>
@@ -6281,7 +6281,7 @@
           <a:p>
             <a:fld id="{8B88B800-945A-43B0-8EA5-8657D67FD7E1}" type="datetime1">
               <a:rPr lang="en-US" smtClean="0"/>
-              <a:t>8/20/2020</a:t>
+              <a:t>8/25/2020</a:t>
             </a:fld>
             <a:endParaRPr lang="en-US" dirty="0"/>
           </a:p>
@@ -14441,7 +14441,7 @@
                 <a:latin typeface="Consolas" panose="020B0609020204030204" pitchFamily="49" charset="0"/>
                 <a:cs typeface="Arial" panose="020B0604020202020204" pitchFamily="34" charset="0"/>
               </a:rPr>
-              <a:t>$('#form').on('reset', (evt) =&gt; {</a:t>
+              <a:t>$('#form').on('submit', (evt) =&gt; {</a:t>
             </a:r>
           </a:p>
           <a:p>
@@ -14727,7 +14727,7 @@
                 <a:latin typeface="Consolas" panose="020B0609020204030204" pitchFamily="49" charset="0"/>
                 <a:cs typeface="Arial" panose="020B0604020202020204" pitchFamily="34" charset="0"/>
               </a:rPr>
-              <a:t>$('#form').on('reset', (evt) =&gt; {</a:t>
+              <a:t>$('#form').on('submit', (evt) =&gt; {</a:t>
             </a:r>
           </a:p>
           <a:p>
@@ -14926,7 +14926,7 @@
           <a:p>
             <a:r>
               <a:rPr lang="en-US" u="sng"/>
-              <a:t>Examples</a:t>
+              <a:t>Example</a:t>
             </a:r>
             <a:endParaRPr lang="en-US" u="sng" dirty="0"/>
           </a:p>
@@ -14950,10 +14950,317 @@
         </p:nvSpPr>
         <p:spPr/>
         <p:txBody>
-          <a:bodyPr/>
-          <a:lstStyle/>
-          <a:p>
-            <a:endParaRPr lang="en-US"/>
+          <a:bodyPr>
+            <a:normAutofit/>
+          </a:bodyPr>
+          <a:lstStyle/>
+          <a:p>
+            <a:pPr marL="0" indent="0" fontAlgn="base">
+              <a:lnSpc>
+                <a:spcPct val="100000"/>
+              </a:lnSpc>
+              <a:spcBef>
+                <a:spcPts val="0"/>
+              </a:spcBef>
+              <a:buNone/>
+            </a:pPr>
+            <a:r>
+              <a:rPr lang="en-US" sz="1600" b="1">
+                <a:latin typeface="Consolas" panose="020B0609020204030204" pitchFamily="49" charset="0"/>
+                <a:cs typeface="Arial" panose="020B0604020202020204" pitchFamily="34" charset="0"/>
+              </a:rPr>
+              <a:t>$('#calc-tax-form').submit((evt) =&gt; {</a:t>
+            </a:r>
+          </a:p>
+          <a:p>
+            <a:pPr marL="0" indent="0" fontAlgn="base">
+              <a:lnSpc>
+                <a:spcPct val="100000"/>
+              </a:lnSpc>
+              <a:spcBef>
+                <a:spcPts val="0"/>
+              </a:spcBef>
+              <a:buNone/>
+            </a:pPr>
+            <a:r>
+              <a:rPr lang="en-US" sz="1600">
+                <a:latin typeface="Consolas" panose="020B0609020204030204" pitchFamily="49" charset="0"/>
+                <a:cs typeface="Arial" panose="020B0604020202020204" pitchFamily="34" charset="0"/>
+              </a:rPr>
+              <a:t>  </a:t>
+            </a:r>
+            <a:r>
+              <a:rPr lang="en-US" sz="1600" b="1">
+                <a:latin typeface="Consolas" panose="020B0609020204030204" pitchFamily="49" charset="0"/>
+                <a:cs typeface="Arial" panose="020B0604020202020204" pitchFamily="34" charset="0"/>
+              </a:rPr>
+              <a:t>evt.preventDefault();</a:t>
+            </a:r>
+          </a:p>
+          <a:p>
+            <a:pPr marL="0" indent="0" fontAlgn="base">
+              <a:lnSpc>
+                <a:spcPct val="100000"/>
+              </a:lnSpc>
+              <a:spcBef>
+                <a:spcPts val="0"/>
+              </a:spcBef>
+              <a:buNone/>
+            </a:pPr>
+            <a:endParaRPr lang="en-US" sz="1600">
+              <a:latin typeface="Consolas" panose="020B0609020204030204" pitchFamily="49" charset="0"/>
+              <a:cs typeface="Arial" panose="020B0604020202020204" pitchFamily="34" charset="0"/>
+            </a:endParaRPr>
+          </a:p>
+          <a:p>
+            <a:pPr marL="0" indent="0" fontAlgn="base">
+              <a:lnSpc>
+                <a:spcPct val="100000"/>
+              </a:lnSpc>
+              <a:spcBef>
+                <a:spcPts val="0"/>
+              </a:spcBef>
+              <a:buNone/>
+            </a:pPr>
+            <a:r>
+              <a:rPr lang="en-US" sz="1600">
+                <a:latin typeface="Consolas" panose="020B0609020204030204" pitchFamily="49" charset="0"/>
+                <a:cs typeface="Arial" panose="020B0604020202020204" pitchFamily="34" charset="0"/>
+              </a:rPr>
+              <a:t>  const price = parseFloat(</a:t>
+            </a:r>
+            <a:r>
+              <a:rPr lang="en-US" sz="1600" b="1">
+                <a:latin typeface="Consolas" panose="020B0609020204030204" pitchFamily="49" charset="0"/>
+                <a:cs typeface="Arial" panose="020B0604020202020204" pitchFamily="34" charset="0"/>
+              </a:rPr>
+              <a:t>$('#price').val()</a:t>
+            </a:r>
+            <a:r>
+              <a:rPr lang="en-US" sz="1600">
+                <a:latin typeface="Consolas" panose="020B0609020204030204" pitchFamily="49" charset="0"/>
+                <a:cs typeface="Arial" panose="020B0604020202020204" pitchFamily="34" charset="0"/>
+              </a:rPr>
+              <a:t>);</a:t>
+            </a:r>
+          </a:p>
+          <a:p>
+            <a:pPr marL="0" indent="0" fontAlgn="base">
+              <a:lnSpc>
+                <a:spcPct val="100000"/>
+              </a:lnSpc>
+              <a:spcBef>
+                <a:spcPts val="0"/>
+              </a:spcBef>
+              <a:buNone/>
+            </a:pPr>
+            <a:r>
+              <a:rPr lang="en-US" sz="1600">
+                <a:latin typeface="Consolas" panose="020B0609020204030204" pitchFamily="49" charset="0"/>
+                <a:cs typeface="Arial" panose="020B0604020202020204" pitchFamily="34" charset="0"/>
+              </a:rPr>
+              <a:t>  const tax = parseFloat(</a:t>
+            </a:r>
+            <a:r>
+              <a:rPr lang="en-US" sz="1600" b="1">
+                <a:latin typeface="Consolas" panose="020B0609020204030204" pitchFamily="49" charset="0"/>
+                <a:cs typeface="Arial" panose="020B0604020202020204" pitchFamily="34" charset="0"/>
+              </a:rPr>
+              <a:t>$('#tax').val()</a:t>
+            </a:r>
+            <a:r>
+              <a:rPr lang="en-US" sz="1600">
+                <a:latin typeface="Consolas" panose="020B0609020204030204" pitchFamily="49" charset="0"/>
+                <a:cs typeface="Arial" panose="020B0604020202020204" pitchFamily="34" charset="0"/>
+              </a:rPr>
+              <a:t>);</a:t>
+            </a:r>
+          </a:p>
+          <a:p>
+            <a:pPr marL="0" indent="0" fontAlgn="base">
+              <a:lnSpc>
+                <a:spcPct val="100000"/>
+              </a:lnSpc>
+              <a:spcBef>
+                <a:spcPts val="0"/>
+              </a:spcBef>
+              <a:buNone/>
+            </a:pPr>
+            <a:r>
+              <a:rPr lang="en-US" sz="1600">
+                <a:latin typeface="Consolas" panose="020B0609020204030204" pitchFamily="49" charset="0"/>
+                <a:cs typeface="Arial" panose="020B0604020202020204" pitchFamily="34" charset="0"/>
+              </a:rPr>
+              <a:t>  </a:t>
+            </a:r>
+          </a:p>
+          <a:p>
+            <a:pPr marL="0" indent="0" fontAlgn="base">
+              <a:lnSpc>
+                <a:spcPct val="100000"/>
+              </a:lnSpc>
+              <a:spcBef>
+                <a:spcPts val="0"/>
+              </a:spcBef>
+              <a:buNone/>
+            </a:pPr>
+            <a:r>
+              <a:rPr lang="en-US" sz="1600">
+                <a:latin typeface="Consolas" panose="020B0609020204030204" pitchFamily="49" charset="0"/>
+                <a:cs typeface="Arial" panose="020B0604020202020204" pitchFamily="34" charset="0"/>
+              </a:rPr>
+              <a:t>  if (price &amp;&amp; tax) {</a:t>
+            </a:r>
+          </a:p>
+          <a:p>
+            <a:pPr marL="0" indent="0" fontAlgn="base">
+              <a:lnSpc>
+                <a:spcPct val="100000"/>
+              </a:lnSpc>
+              <a:spcBef>
+                <a:spcPts val="0"/>
+              </a:spcBef>
+              <a:buNone/>
+            </a:pPr>
+            <a:r>
+              <a:rPr lang="en-US" sz="1600">
+                <a:latin typeface="Consolas" panose="020B0609020204030204" pitchFamily="49" charset="0"/>
+                <a:cs typeface="Arial" panose="020B0604020202020204" pitchFamily="34" charset="0"/>
+              </a:rPr>
+              <a:t>    const total = Math.ceil(price * (1 + tax / 100));</a:t>
+            </a:r>
+          </a:p>
+          <a:p>
+            <a:pPr marL="0" indent="0" fontAlgn="base">
+              <a:lnSpc>
+                <a:spcPct val="100000"/>
+              </a:lnSpc>
+              <a:spcBef>
+                <a:spcPts val="0"/>
+              </a:spcBef>
+              <a:buNone/>
+            </a:pPr>
+            <a:r>
+              <a:rPr lang="en-US" sz="1600">
+                <a:latin typeface="Consolas" panose="020B0609020204030204" pitchFamily="49" charset="0"/>
+                <a:cs typeface="Arial" panose="020B0604020202020204" pitchFamily="34" charset="0"/>
+              </a:rPr>
+              <a:t>    </a:t>
+            </a:r>
+            <a:r>
+              <a:rPr lang="en-US" sz="1600" b="1">
+                <a:latin typeface="Consolas" panose="020B0609020204030204" pitchFamily="49" charset="0"/>
+                <a:cs typeface="Arial" panose="020B0604020202020204" pitchFamily="34" charset="0"/>
+              </a:rPr>
+              <a:t>$('#result').html(</a:t>
+            </a:r>
+            <a:r>
+              <a:rPr lang="en-US" sz="1600">
+                <a:latin typeface="Consolas" panose="020B0609020204030204" pitchFamily="49" charset="0"/>
+                <a:cs typeface="Arial" panose="020B0604020202020204" pitchFamily="34" charset="0"/>
+              </a:rPr>
+              <a:t>`Your total is ${total.toFixed(2)} USD.`</a:t>
+            </a:r>
+            <a:r>
+              <a:rPr lang="en-US" sz="1600" b="1">
+                <a:latin typeface="Consolas" panose="020B0609020204030204" pitchFamily="49" charset="0"/>
+                <a:cs typeface="Arial" panose="020B0604020202020204" pitchFamily="34" charset="0"/>
+              </a:rPr>
+              <a:t>);</a:t>
+            </a:r>
+          </a:p>
+          <a:p>
+            <a:pPr marL="0" indent="0" fontAlgn="base">
+              <a:lnSpc>
+                <a:spcPct val="100000"/>
+              </a:lnSpc>
+              <a:spcBef>
+                <a:spcPts val="0"/>
+              </a:spcBef>
+              <a:buNone/>
+            </a:pPr>
+            <a:r>
+              <a:rPr lang="en-US" sz="1600">
+                <a:latin typeface="Consolas" panose="020B0609020204030204" pitchFamily="49" charset="0"/>
+                <a:cs typeface="Arial" panose="020B0604020202020204" pitchFamily="34" charset="0"/>
+              </a:rPr>
+              <a:t>  } else {</a:t>
+            </a:r>
+          </a:p>
+          <a:p>
+            <a:pPr marL="0" indent="0" fontAlgn="base">
+              <a:lnSpc>
+                <a:spcPct val="100000"/>
+              </a:lnSpc>
+              <a:spcBef>
+                <a:spcPts val="0"/>
+              </a:spcBef>
+              <a:buNone/>
+            </a:pPr>
+            <a:r>
+              <a:rPr lang="en-US" sz="1600">
+                <a:latin typeface="Consolas" panose="020B0609020204030204" pitchFamily="49" charset="0"/>
+                <a:cs typeface="Arial" panose="020B0604020202020204" pitchFamily="34" charset="0"/>
+              </a:rPr>
+              <a:t>    </a:t>
+            </a:r>
+            <a:r>
+              <a:rPr lang="en-US" sz="1600" b="1">
+                <a:latin typeface="Consolas" panose="020B0609020204030204" pitchFamily="49" charset="0"/>
+                <a:cs typeface="Arial" panose="020B0604020202020204" pitchFamily="34" charset="0"/>
+              </a:rPr>
+              <a:t>$('#result').html(</a:t>
+            </a:r>
+            <a:r>
+              <a:rPr lang="en-US" sz="1600">
+                <a:latin typeface="Consolas" panose="020B0609020204030204" pitchFamily="49" charset="0"/>
+                <a:cs typeface="Arial" panose="020B0604020202020204" pitchFamily="34" charset="0"/>
+              </a:rPr>
+              <a:t>'Please enter a price and tax percentage.'</a:t>
+            </a:r>
+            <a:r>
+              <a:rPr lang="en-US" sz="1600" b="1">
+                <a:latin typeface="Consolas" panose="020B0609020204030204" pitchFamily="49" charset="0"/>
+                <a:cs typeface="Arial" panose="020B0604020202020204" pitchFamily="34" charset="0"/>
+              </a:rPr>
+              <a:t>);</a:t>
+            </a:r>
+          </a:p>
+          <a:p>
+            <a:pPr marL="0" indent="0" fontAlgn="base">
+              <a:lnSpc>
+                <a:spcPct val="100000"/>
+              </a:lnSpc>
+              <a:spcBef>
+                <a:spcPts val="0"/>
+              </a:spcBef>
+              <a:buNone/>
+            </a:pPr>
+            <a:r>
+              <a:rPr lang="en-US" sz="1600">
+                <a:latin typeface="Consolas" panose="020B0609020204030204" pitchFamily="49" charset="0"/>
+                <a:cs typeface="Arial" panose="020B0604020202020204" pitchFamily="34" charset="0"/>
+              </a:rPr>
+              <a:t>  }</a:t>
+            </a:r>
+          </a:p>
+          <a:p>
+            <a:pPr marL="0" indent="0" fontAlgn="base">
+              <a:lnSpc>
+                <a:spcPct val="100000"/>
+              </a:lnSpc>
+              <a:spcBef>
+                <a:spcPts val="0"/>
+              </a:spcBef>
+              <a:buNone/>
+            </a:pPr>
+            <a:r>
+              <a:rPr lang="en-US" sz="1600" b="1">
+                <a:latin typeface="Consolas" panose="020B0609020204030204" pitchFamily="49" charset="0"/>
+                <a:cs typeface="Arial" panose="020B0604020202020204" pitchFamily="34" charset="0"/>
+              </a:rPr>
+              <a:t>});</a:t>
+            </a:r>
           </a:p>
         </p:txBody>
       </p:sp>
@@ -17508,6 +17815,15 @@
 </file>
 
 <file path=customXml/item2.xml><?xml version="1.0" encoding="utf-8"?>
+<p:properties xmlns:p="http://schemas.microsoft.com/office/2006/metadata/properties" xmlns:xsi="http://www.w3.org/2001/XMLSchema-instance" xmlns:pc="http://schemas.microsoft.com/office/infopath/2007/PartnerControls">
+  <documentManagement>
+    <Status xmlns="71af3243-3dd4-4a8d-8c0d-dd76da1f02a5">Not started</Status>
+    <MediaServiceKeyPoints xmlns="71af3243-3dd4-4a8d-8c0d-dd76da1f02a5" xsi:nil="true"/>
+  </documentManagement>
+</p:properties>
+</file>
+
+<file path=customXml/item3.xml><?xml version="1.0" encoding="utf-8"?>
 <ct:contentTypeSchema xmlns:ct="http://schemas.microsoft.com/office/2006/metadata/contentType" xmlns:ma="http://schemas.microsoft.com/office/2006/metadata/properties/metaAttributes" ct:_="" ma:_="" ma:contentTypeName="Document" ma:contentTypeID="0x01010079F111ED35F8CC479449609E8A0923A6" ma:contentTypeVersion="12" ma:contentTypeDescription="Create a new document." ma:contentTypeScope="" ma:versionID="a410dd7f93c95333ffa1b60ed6adedd1">
   <xsd:schema xmlns:xsd="http://www.w3.org/2001/XMLSchema" xmlns:xs="http://www.w3.org/2001/XMLSchema" xmlns:p="http://schemas.microsoft.com/office/2006/metadata/properties" xmlns:ns2="71af3243-3dd4-4a8d-8c0d-dd76da1f02a5" xmlns:ns3="16c05727-aa75-4e4a-9b5f-8a80a1165891" targetNamespace="http://schemas.microsoft.com/office/2006/metadata/properties" ma:root="true" ma:fieldsID="a936d9baba76aa3866493feff160faab" ns2:_="" ns3:_="">
     <xsd:import namespace="71af3243-3dd4-4a8d-8c0d-dd76da1f02a5"/>
@@ -17728,15 +18044,6 @@
 </ct:contentTypeSchema>
 </file>
 
-<file path=customXml/item3.xml><?xml version="1.0" encoding="utf-8"?>
-<p:properties xmlns:p="http://schemas.microsoft.com/office/2006/metadata/properties" xmlns:xsi="http://www.w3.org/2001/XMLSchema-instance" xmlns:pc="http://schemas.microsoft.com/office/infopath/2007/PartnerControls">
-  <documentManagement>
-    <Status xmlns="71af3243-3dd4-4a8d-8c0d-dd76da1f02a5">Not started</Status>
-    <MediaServiceKeyPoints xmlns="71af3243-3dd4-4a8d-8c0d-dd76da1f02a5" xsi:nil="true"/>
-  </documentManagement>
-</p:properties>
-</file>
-
 <file path=customXml/itemProps1.xml><?xml version="1.0" encoding="utf-8"?>
 <ds:datastoreItem xmlns:ds="http://schemas.openxmlformats.org/officeDocument/2006/customXml" ds:itemID="{CDB58277-F8DF-46FF-84EC-EF41B835E69F}">
   <ds:schemaRefs>
@@ -17746,6 +18053,23 @@
 </file>
 
 <file path=customXml/itemProps2.xml><?xml version="1.0" encoding="utf-8"?>
+<ds:datastoreItem xmlns:ds="http://schemas.openxmlformats.org/officeDocument/2006/customXml" ds:itemID="{137651BA-F45C-4845-9AB3-E0A65B39F5E1}">
+  <ds:schemaRefs>
+    <ds:schemaRef ds:uri="http://purl.org/dc/elements/1.1/"/>
+    <ds:schemaRef ds:uri="http://schemas.openxmlformats.org/package/2006/metadata/core-properties"/>
+    <ds:schemaRef ds:uri="16c05727-aa75-4e4a-9b5f-8a80a1165891"/>
+    <ds:schemaRef ds:uri="http://schemas.microsoft.com/office/infopath/2007/PartnerControls"/>
+    <ds:schemaRef ds:uri="http://purl.org/dc/terms/"/>
+    <ds:schemaRef ds:uri="http://schemas.microsoft.com/office/2006/documentManagement/types"/>
+    <ds:schemaRef ds:uri="71af3243-3dd4-4a8d-8c0d-dd76da1f02a5"/>
+    <ds:schemaRef ds:uri="http://schemas.microsoft.com/office/2006/metadata/properties"/>
+    <ds:schemaRef ds:uri="http://www.w3.org/XML/1998/namespace"/>
+    <ds:schemaRef ds:uri="http://purl.org/dc/dcmitype/"/>
+  </ds:schemaRefs>
+</ds:datastoreItem>
+</file>
+
+<file path=customXml/itemProps3.xml><?xml version="1.0" encoding="utf-8"?>
 <ds:datastoreItem xmlns:ds="http://schemas.openxmlformats.org/officeDocument/2006/customXml" ds:itemID="{2D276E62-80A3-44DD-9BCC-97ED2B99B57F}">
   <ds:schemaRefs>
     <ds:schemaRef ds:uri="http://schemas.microsoft.com/office/2006/metadata/contentType"/>
@@ -17762,21 +18086,4 @@
     <ds:schemaRef ds:uri="http://schemas.microsoft.com/internal/obd"/>
   </ds:schemaRefs>
 </ds:datastoreItem>
-</file>
-
-<file path=customXml/itemProps3.xml><?xml version="1.0" encoding="utf-8"?>
-<ds:datastoreItem xmlns:ds="http://schemas.openxmlformats.org/officeDocument/2006/customXml" ds:itemID="{137651BA-F45C-4845-9AB3-E0A65B39F5E1}">
-  <ds:schemaRefs>
-    <ds:schemaRef ds:uri="http://purl.org/dc/elements/1.1/"/>
-    <ds:schemaRef ds:uri="http://schemas.openxmlformats.org/package/2006/metadata/core-properties"/>
-    <ds:schemaRef ds:uri="16c05727-aa75-4e4a-9b5f-8a80a1165891"/>
-    <ds:schemaRef ds:uri="http://schemas.microsoft.com/office/infopath/2007/PartnerControls"/>
-    <ds:schemaRef ds:uri="http://purl.org/dc/terms/"/>
-    <ds:schemaRef ds:uri="http://schemas.microsoft.com/office/2006/documentManagement/types"/>
-    <ds:schemaRef ds:uri="71af3243-3dd4-4a8d-8c0d-dd76da1f02a5"/>
-    <ds:schemaRef ds:uri="http://schemas.microsoft.com/office/2006/metadata/properties"/>
-    <ds:schemaRef ds:uri="http://www.w3.org/XML/1998/namespace"/>
-    <ds:schemaRef ds:uri="http://purl.org/dc/dcmitype/"/>
-  </ds:schemaRefs>
-</ds:datastoreItem>
 </file>
</xml_diff>

<commit_message>
adjusting objectives and fixing a logic error in the example
</commit_message>
<xml_diff>
--- a/unit_00/html_review/06 jQuery.pptx
+++ b/unit_00/html_review/06 jQuery.pptx
@@ -9151,7 +9151,7 @@
               <a:rPr lang="en-US" sz="1800">
                 <a:cs typeface="Arial" pitchFamily="34" charset="0"/>
               </a:rPr>
-              <a:t>jQuery Getters and Setters</a:t>
+              <a:t>Manipulate and query the DOM with jQuery</a:t>
             </a:r>
           </a:p>
           <a:p>
@@ -9160,14 +9160,6 @@
                 <a:cs typeface="Arial" pitchFamily="34" charset="0"/>
               </a:rPr>
               <a:t>Event Handling with jQuery</a:t>
-            </a:r>
-          </a:p>
-          <a:p>
-            <a:r>
-              <a:rPr lang="en-US" sz="1800">
-                <a:cs typeface="Arial" pitchFamily="34" charset="0"/>
-              </a:rPr>
-              <a:t>Adding and Removing classes dynamically with jQuery</a:t>
             </a:r>
           </a:p>
         </p:txBody>
@@ -9243,12 +9235,14 @@
         </p:nvSpPr>
         <p:spPr/>
         <p:txBody>
-          <a:bodyPr/>
-          <a:lstStyle/>
-          <a:p>
-            <a:r>
-              <a:rPr lang="en-US" cap="none"/>
-              <a:t>Getters &amp; Setters</a:t>
+          <a:bodyPr>
+            <a:normAutofit/>
+          </a:bodyPr>
+          <a:lstStyle/>
+          <a:p>
+            <a:r>
+              <a:rPr lang="en-US" sz="4400" cap="none"/>
+              <a:t>Document Object Model (DOM)</a:t>
             </a:r>
           </a:p>
         </p:txBody>
@@ -9476,14 +9470,14 @@
           <p:nvPr>
             <p:extLst>
               <p:ext uri="{D42A27DB-BD31-4B8C-83A1-F6EECF244321}">
-                <p14:modId xmlns:p14="http://schemas.microsoft.com/office/powerpoint/2010/main" val="2246044376"/>
+                <p14:modId xmlns:p14="http://schemas.microsoft.com/office/powerpoint/2010/main" val="3045787492"/>
               </p:ext>
             </p:extLst>
           </p:nvPr>
         </p:nvGraphicFramePr>
         <p:xfrm>
-          <a:off x="1066800" y="2400377"/>
-          <a:ext cx="10058400" cy="2961640"/>
+          <a:off x="684245" y="2286764"/>
+          <a:ext cx="9047584" cy="3388360"/>
         </p:xfrm>
         <a:graphic>
           <a:graphicData uri="http://schemas.openxmlformats.org/drawingml/2006/table">
@@ -9492,21 +9486,21 @@
                 <a:tableStyleId>{073A0DAA-6AF3-43AB-8588-CEC1D06C72B9}</a:tableStyleId>
               </a:tblPr>
               <a:tblGrid>
-                <a:gridCol w="3094653">
+                <a:gridCol w="2273559">
                   <a:extLst>
                     <a:ext uri="{9D8B030D-6E8A-4147-A177-3AD203B41FA5}">
                       <a16:colId xmlns:a16="http://schemas.microsoft.com/office/drawing/2014/main" val="1793707310"/>
                     </a:ext>
                   </a:extLst>
                 </a:gridCol>
-                <a:gridCol w="3125755">
+                <a:gridCol w="2901821">
                   <a:extLst>
                     <a:ext uri="{9D8B030D-6E8A-4147-A177-3AD203B41FA5}">
                       <a16:colId xmlns:a16="http://schemas.microsoft.com/office/drawing/2014/main" val="3449383644"/>
                     </a:ext>
                   </a:extLst>
                 </a:gridCol>
-                <a:gridCol w="3837992">
+                <a:gridCol w="3872204">
                   <a:extLst>
                     <a:ext uri="{9D8B030D-6E8A-4147-A177-3AD203B41FA5}">
                       <a16:colId xmlns:a16="http://schemas.microsoft.com/office/drawing/2014/main" val="1726124295"/>
@@ -10098,7 +10092,7 @@
                         <a:rPr lang="en-US" sz="1400">
                           <a:latin typeface="Consolas" panose="020B0609020204030204" pitchFamily="49" charset="0"/>
                         </a:rPr>
-                        <a:t>.attr('color')</a:t>
+                        <a:t>.css('color')</a:t>
                       </a:r>
                     </a:p>
                   </a:txBody>
@@ -10137,7 +10131,7 @@
                         <a:rPr lang="en-US" sz="1400">
                           <a:latin typeface="Consolas" panose="020B0609020204030204" pitchFamily="49" charset="0"/>
                         </a:rPr>
-                        <a:t>.attr('color', '#ff0000')</a:t>
+                        <a:t>.css('color', '#ff0000')</a:t>
                       </a:r>
                     </a:p>
                   </a:txBody>
@@ -15127,7 +15121,7 @@
                 <a:latin typeface="Consolas" panose="020B0609020204030204" pitchFamily="49" charset="0"/>
                 <a:cs typeface="Arial" panose="020B0604020202020204" pitchFamily="34" charset="0"/>
               </a:rPr>
-              <a:t>    const total = Math.ceil(price * (1 + tax / 100));</a:t>
+              <a:t>    const total = price * (1 + tax / 100);</a:t>
             </a:r>
           </a:p>
           <a:p>
@@ -15505,7 +15499,7 @@
               <a:rPr lang="en-US" sz="1800">
                 <a:cs typeface="Arial" pitchFamily="34" charset="0"/>
               </a:rPr>
-              <a:t>jQuery Getters and Setters</a:t>
+              <a:t>Manipulate and query the DOM with jQuery</a:t>
             </a:r>
           </a:p>
           <a:p>
@@ -15514,14 +15508,6 @@
                 <a:cs typeface="Arial" pitchFamily="34" charset="0"/>
               </a:rPr>
               <a:t>Event Handling with jQuery</a:t>
-            </a:r>
-          </a:p>
-          <a:p>
-            <a:r>
-              <a:rPr lang="en-US" sz="1800">
-                <a:cs typeface="Arial" pitchFamily="34" charset="0"/>
-              </a:rPr>
-              <a:t>Adding and Removing classes dynamically with jQuery</a:t>
             </a:r>
           </a:p>
         </p:txBody>
@@ -15634,36 +15620,72 @@
           <a:p>
             <a:r>
               <a:rPr lang="en-US" sz="1800">
-                <a:cs typeface="Arial" panose="020B0604020202020204" pitchFamily="34" charset="0"/>
-                <a:hlinkClick r:id="rId3"/>
+                <a:solidFill>
+                  <a:srgbClr val="00B0F0"/>
+                </a:solidFill>
+                <a:cs typeface="Arial" panose="020B0604020202020204" pitchFamily="34" charset="0"/>
+                <a:hlinkClick r:id="rId3">
+                  <a:extLst>
+                    <a:ext uri="{A12FA001-AC4F-418D-AE19-62706E023703}">
+                      <ahyp:hlinkClr xmlns:ahyp="http://schemas.microsoft.com/office/drawing/2018/hyperlinkcolor" val="tx"/>
+                    </a:ext>
+                  </a:extLst>
+                </a:hlinkClick>
               </a:rPr>
               <a:t>jQuery Website</a:t>
             </a:r>
             <a:endParaRPr lang="en-US" sz="1800">
+              <a:solidFill>
+                <a:srgbClr val="00B0F0"/>
+              </a:solidFill>
               <a:cs typeface="Arial" panose="020B0604020202020204" pitchFamily="34" charset="0"/>
             </a:endParaRPr>
           </a:p>
           <a:p>
             <a:r>
               <a:rPr lang="en-US" sz="1800">
-                <a:cs typeface="Arial" panose="020B0604020202020204" pitchFamily="34" charset="0"/>
-                <a:hlinkClick r:id="rId4"/>
+                <a:solidFill>
+                  <a:srgbClr val="00B0F0"/>
+                </a:solidFill>
+                <a:cs typeface="Arial" panose="020B0604020202020204" pitchFamily="34" charset="0"/>
+                <a:hlinkClick r:id="rId4">
+                  <a:extLst>
+                    <a:ext uri="{A12FA001-AC4F-418D-AE19-62706E023703}">
+                      <ahyp:hlinkClr xmlns:ahyp="http://schemas.microsoft.com/office/drawing/2018/hyperlinkcolor" val="tx"/>
+                    </a:ext>
+                  </a:extLst>
+                </a:hlinkClick>
               </a:rPr>
               <a:t>jQuery API Docs</a:t>
             </a:r>
             <a:endParaRPr lang="en-US" sz="1800" dirty="0">
+              <a:solidFill>
+                <a:srgbClr val="00B0F0"/>
+              </a:solidFill>
               <a:cs typeface="Arial" panose="020B0604020202020204" pitchFamily="34" charset="0"/>
             </a:endParaRPr>
           </a:p>
           <a:p>
             <a:r>
               <a:rPr lang="en-US" sz="1800">
-                <a:cs typeface="Arial" panose="020B0604020202020204" pitchFamily="34" charset="0"/>
-                <a:hlinkClick r:id="rId5"/>
+                <a:solidFill>
+                  <a:srgbClr val="00B0F0"/>
+                </a:solidFill>
+                <a:cs typeface="Arial" panose="020B0604020202020204" pitchFamily="34" charset="0"/>
+                <a:hlinkClick r:id="rId5">
+                  <a:extLst>
+                    <a:ext uri="{A12FA001-AC4F-418D-AE19-62706E023703}">
+                      <ahyp:hlinkClr xmlns:ahyp="http://schemas.microsoft.com/office/drawing/2018/hyperlinkcolor" val="tx"/>
+                    </a:ext>
+                  </a:extLst>
+                </a:hlinkClick>
               </a:rPr>
               <a:t>jQuery Learn: Handling Events</a:t>
             </a:r>
             <a:endParaRPr lang="en-US" sz="1800" dirty="0">
+              <a:solidFill>
+                <a:srgbClr val="00B0F0"/>
+              </a:solidFill>
               <a:cs typeface="Arial" panose="020B0604020202020204" pitchFamily="34" charset="0"/>
             </a:endParaRPr>
           </a:p>
@@ -15808,7 +15830,16 @@
             </a:r>
             <a:r>
               <a:rPr lang="en-US" sz="1800" b="1">
-                <a:hlinkClick r:id="rId3"/>
+                <a:solidFill>
+                  <a:srgbClr val="00B0F0"/>
+                </a:solidFill>
+                <a:hlinkClick r:id="rId3">
+                  <a:extLst>
+                    <a:ext uri="{A12FA001-AC4F-418D-AE19-62706E023703}">
+                      <ahyp:hlinkClr xmlns:ahyp="http://schemas.microsoft.com/office/drawing/2018/hyperlinkcolor" val="tx"/>
+                    </a:ext>
+                  </a:extLst>
+                </a:hlinkClick>
               </a:rPr>
               <a:t>https://jquery.com/</a:t>
             </a:r>
@@ -17815,15 +17846,6 @@
 </file>
 
 <file path=customXml/item2.xml><?xml version="1.0" encoding="utf-8"?>
-<p:properties xmlns:p="http://schemas.microsoft.com/office/2006/metadata/properties" xmlns:xsi="http://www.w3.org/2001/XMLSchema-instance" xmlns:pc="http://schemas.microsoft.com/office/infopath/2007/PartnerControls">
-  <documentManagement>
-    <Status xmlns="71af3243-3dd4-4a8d-8c0d-dd76da1f02a5">Not started</Status>
-    <MediaServiceKeyPoints xmlns="71af3243-3dd4-4a8d-8c0d-dd76da1f02a5" xsi:nil="true"/>
-  </documentManagement>
-</p:properties>
-</file>
-
-<file path=customXml/item3.xml><?xml version="1.0" encoding="utf-8"?>
 <ct:contentTypeSchema xmlns:ct="http://schemas.microsoft.com/office/2006/metadata/contentType" xmlns:ma="http://schemas.microsoft.com/office/2006/metadata/properties/metaAttributes" ct:_="" ma:_="" ma:contentTypeName="Document" ma:contentTypeID="0x01010079F111ED35F8CC479449609E8A0923A6" ma:contentTypeVersion="12" ma:contentTypeDescription="Create a new document." ma:contentTypeScope="" ma:versionID="a410dd7f93c95333ffa1b60ed6adedd1">
   <xsd:schema xmlns:xsd="http://www.w3.org/2001/XMLSchema" xmlns:xs="http://www.w3.org/2001/XMLSchema" xmlns:p="http://schemas.microsoft.com/office/2006/metadata/properties" xmlns:ns2="71af3243-3dd4-4a8d-8c0d-dd76da1f02a5" xmlns:ns3="16c05727-aa75-4e4a-9b5f-8a80a1165891" targetNamespace="http://schemas.microsoft.com/office/2006/metadata/properties" ma:root="true" ma:fieldsID="a936d9baba76aa3866493feff160faab" ns2:_="" ns3:_="">
     <xsd:import namespace="71af3243-3dd4-4a8d-8c0d-dd76da1f02a5"/>
@@ -18044,6 +18066,15 @@
 </ct:contentTypeSchema>
 </file>
 
+<file path=customXml/item3.xml><?xml version="1.0" encoding="utf-8"?>
+<p:properties xmlns:p="http://schemas.microsoft.com/office/2006/metadata/properties" xmlns:xsi="http://www.w3.org/2001/XMLSchema-instance" xmlns:pc="http://schemas.microsoft.com/office/infopath/2007/PartnerControls">
+  <documentManagement>
+    <Status xmlns="71af3243-3dd4-4a8d-8c0d-dd76da1f02a5">Not started</Status>
+    <MediaServiceKeyPoints xmlns="71af3243-3dd4-4a8d-8c0d-dd76da1f02a5" xsi:nil="true"/>
+  </documentManagement>
+</p:properties>
+</file>
+
 <file path=customXml/itemProps1.xml><?xml version="1.0" encoding="utf-8"?>
 <ds:datastoreItem xmlns:ds="http://schemas.openxmlformats.org/officeDocument/2006/customXml" ds:itemID="{CDB58277-F8DF-46FF-84EC-EF41B835E69F}">
   <ds:schemaRefs>
@@ -18053,23 +18084,6 @@
 </file>
 
 <file path=customXml/itemProps2.xml><?xml version="1.0" encoding="utf-8"?>
-<ds:datastoreItem xmlns:ds="http://schemas.openxmlformats.org/officeDocument/2006/customXml" ds:itemID="{137651BA-F45C-4845-9AB3-E0A65B39F5E1}">
-  <ds:schemaRefs>
-    <ds:schemaRef ds:uri="http://purl.org/dc/elements/1.1/"/>
-    <ds:schemaRef ds:uri="http://schemas.openxmlformats.org/package/2006/metadata/core-properties"/>
-    <ds:schemaRef ds:uri="16c05727-aa75-4e4a-9b5f-8a80a1165891"/>
-    <ds:schemaRef ds:uri="http://schemas.microsoft.com/office/infopath/2007/PartnerControls"/>
-    <ds:schemaRef ds:uri="http://purl.org/dc/terms/"/>
-    <ds:schemaRef ds:uri="http://schemas.microsoft.com/office/2006/documentManagement/types"/>
-    <ds:schemaRef ds:uri="71af3243-3dd4-4a8d-8c0d-dd76da1f02a5"/>
-    <ds:schemaRef ds:uri="http://schemas.microsoft.com/office/2006/metadata/properties"/>
-    <ds:schemaRef ds:uri="http://www.w3.org/XML/1998/namespace"/>
-    <ds:schemaRef ds:uri="http://purl.org/dc/dcmitype/"/>
-  </ds:schemaRefs>
-</ds:datastoreItem>
-</file>
-
-<file path=customXml/itemProps3.xml><?xml version="1.0" encoding="utf-8"?>
 <ds:datastoreItem xmlns:ds="http://schemas.openxmlformats.org/officeDocument/2006/customXml" ds:itemID="{2D276E62-80A3-44DD-9BCC-97ED2B99B57F}">
   <ds:schemaRefs>
     <ds:schemaRef ds:uri="http://schemas.microsoft.com/office/2006/metadata/contentType"/>
@@ -18086,4 +18100,21 @@
     <ds:schemaRef ds:uri="http://schemas.microsoft.com/internal/obd"/>
   </ds:schemaRefs>
 </ds:datastoreItem>
+</file>
+
+<file path=customXml/itemProps3.xml><?xml version="1.0" encoding="utf-8"?>
+<ds:datastoreItem xmlns:ds="http://schemas.openxmlformats.org/officeDocument/2006/customXml" ds:itemID="{137651BA-F45C-4845-9AB3-E0A65B39F5E1}">
+  <ds:schemaRefs>
+    <ds:schemaRef ds:uri="http://purl.org/dc/elements/1.1/"/>
+    <ds:schemaRef ds:uri="http://schemas.openxmlformats.org/package/2006/metadata/core-properties"/>
+    <ds:schemaRef ds:uri="16c05727-aa75-4e4a-9b5f-8a80a1165891"/>
+    <ds:schemaRef ds:uri="http://schemas.microsoft.com/office/infopath/2007/PartnerControls"/>
+    <ds:schemaRef ds:uri="http://purl.org/dc/terms/"/>
+    <ds:schemaRef ds:uri="http://schemas.microsoft.com/office/2006/documentManagement/types"/>
+    <ds:schemaRef ds:uri="71af3243-3dd4-4a8d-8c0d-dd76da1f02a5"/>
+    <ds:schemaRef ds:uri="http://schemas.microsoft.com/office/2006/metadata/properties"/>
+    <ds:schemaRef ds:uri="http://www.w3.org/XML/1998/namespace"/>
+    <ds:schemaRef ds:uri="http://purl.org/dc/dcmitype/"/>
+  </ds:schemaRefs>
+</ds:datastoreItem>
 </file>
</xml_diff>